<commit_message>
Versão inacabada slides versão Rafael
</commit_message>
<xml_diff>
--- a/Trabalho_Pratico/Apresentacao_v2.pptx
+++ b/Trabalho_Pratico/Apresentacao_v2.pptx
@@ -292,7 +292,7 @@
           <a:p>
             <a:fld id="{FB609B20-27D6-4DEC-ADE6-47F0C781F2BF}" type="datetimeFigureOut">
               <a:rPr lang="pt-PT" smtClean="0"/>
-              <a:t>26/05/2024</a:t>
+              <a:t>27/05/2024</a:t>
             </a:fld>
             <a:endParaRPr lang="pt-PT"/>
           </a:p>
@@ -490,7 +490,7 @@
           <a:p>
             <a:fld id="{FB609B20-27D6-4DEC-ADE6-47F0C781F2BF}" type="datetimeFigureOut">
               <a:rPr lang="pt-PT" smtClean="0"/>
-              <a:t>26/05/2024</a:t>
+              <a:t>27/05/2024</a:t>
             </a:fld>
             <a:endParaRPr lang="pt-PT"/>
           </a:p>
@@ -698,7 +698,7 @@
           <a:p>
             <a:fld id="{FB609B20-27D6-4DEC-ADE6-47F0C781F2BF}" type="datetimeFigureOut">
               <a:rPr lang="pt-PT" smtClean="0"/>
-              <a:t>26/05/2024</a:t>
+              <a:t>27/05/2024</a:t>
             </a:fld>
             <a:endParaRPr lang="pt-PT"/>
           </a:p>
@@ -896,7 +896,7 @@
           <a:p>
             <a:fld id="{FB609B20-27D6-4DEC-ADE6-47F0C781F2BF}" type="datetimeFigureOut">
               <a:rPr lang="pt-PT" smtClean="0"/>
-              <a:t>26/05/2024</a:t>
+              <a:t>27/05/2024</a:t>
             </a:fld>
             <a:endParaRPr lang="pt-PT"/>
           </a:p>
@@ -1171,7 +1171,7 @@
           <a:p>
             <a:fld id="{FB609B20-27D6-4DEC-ADE6-47F0C781F2BF}" type="datetimeFigureOut">
               <a:rPr lang="pt-PT" smtClean="0"/>
-              <a:t>26/05/2024</a:t>
+              <a:t>27/05/2024</a:t>
             </a:fld>
             <a:endParaRPr lang="pt-PT"/>
           </a:p>
@@ -1436,7 +1436,7 @@
           <a:p>
             <a:fld id="{FB609B20-27D6-4DEC-ADE6-47F0C781F2BF}" type="datetimeFigureOut">
               <a:rPr lang="pt-PT" smtClean="0"/>
-              <a:t>26/05/2024</a:t>
+              <a:t>27/05/2024</a:t>
             </a:fld>
             <a:endParaRPr lang="pt-PT"/>
           </a:p>
@@ -1848,7 +1848,7 @@
           <a:p>
             <a:fld id="{FB609B20-27D6-4DEC-ADE6-47F0C781F2BF}" type="datetimeFigureOut">
               <a:rPr lang="pt-PT" smtClean="0"/>
-              <a:t>26/05/2024</a:t>
+              <a:t>27/05/2024</a:t>
             </a:fld>
             <a:endParaRPr lang="pt-PT"/>
           </a:p>
@@ -1989,7 +1989,7 @@
           <a:p>
             <a:fld id="{FB609B20-27D6-4DEC-ADE6-47F0C781F2BF}" type="datetimeFigureOut">
               <a:rPr lang="pt-PT" smtClean="0"/>
-              <a:t>26/05/2024</a:t>
+              <a:t>27/05/2024</a:t>
             </a:fld>
             <a:endParaRPr lang="pt-PT"/>
           </a:p>
@@ -2102,7 +2102,7 @@
           <a:p>
             <a:fld id="{FB609B20-27D6-4DEC-ADE6-47F0C781F2BF}" type="datetimeFigureOut">
               <a:rPr lang="pt-PT" smtClean="0"/>
-              <a:t>26/05/2024</a:t>
+              <a:t>27/05/2024</a:t>
             </a:fld>
             <a:endParaRPr lang="pt-PT"/>
           </a:p>
@@ -2413,7 +2413,7 @@
           <a:p>
             <a:fld id="{FB609B20-27D6-4DEC-ADE6-47F0C781F2BF}" type="datetimeFigureOut">
               <a:rPr lang="pt-PT" smtClean="0"/>
-              <a:t>26/05/2024</a:t>
+              <a:t>27/05/2024</a:t>
             </a:fld>
             <a:endParaRPr lang="pt-PT"/>
           </a:p>
@@ -2701,7 +2701,7 @@
           <a:p>
             <a:fld id="{FB609B20-27D6-4DEC-ADE6-47F0C781F2BF}" type="datetimeFigureOut">
               <a:rPr lang="pt-PT" smtClean="0"/>
-              <a:t>26/05/2024</a:t>
+              <a:t>27/05/2024</a:t>
             </a:fld>
             <a:endParaRPr lang="pt-PT"/>
           </a:p>
@@ -2942,7 +2942,7 @@
           <a:p>
             <a:fld id="{FB609B20-27D6-4DEC-ADE6-47F0C781F2BF}" type="datetimeFigureOut">
               <a:rPr lang="pt-PT" smtClean="0"/>
-              <a:t>26/05/2024</a:t>
+              <a:t>27/05/2024</a:t>
             </a:fld>
             <a:endParaRPr lang="pt-PT"/>
           </a:p>

</xml_diff>